<commit_message>
added stuff for week2 day2
</commit_message>
<xml_diff>
--- a/slides/week2_day1.pptx
+++ b/slides/week2_day1.pptx
@@ -5,34 +5,32 @@
     <p:sldMasterId id="2147483648" r:id="rId1"/>
   </p:sldMasterIdLst>
   <p:notesMasterIdLst>
-    <p:notesMasterId r:id="rId24"/>
+    <p:notesMasterId r:id="rId22"/>
   </p:notesMasterIdLst>
   <p:handoutMasterIdLst>
-    <p:handoutMasterId r:id="rId25"/>
+    <p:handoutMasterId r:id="rId23"/>
   </p:handoutMasterIdLst>
   <p:sldIdLst>
     <p:sldId id="281" r:id="rId2"/>
     <p:sldId id="282" r:id="rId3"/>
-    <p:sldId id="296" r:id="rId4"/>
-    <p:sldId id="298" r:id="rId5"/>
-    <p:sldId id="299" r:id="rId6"/>
-    <p:sldId id="306" r:id="rId7"/>
-    <p:sldId id="310" r:id="rId8"/>
-    <p:sldId id="311" r:id="rId9"/>
-    <p:sldId id="312" r:id="rId10"/>
-    <p:sldId id="314" r:id="rId11"/>
-    <p:sldId id="313" r:id="rId12"/>
-    <p:sldId id="315" r:id="rId13"/>
-    <p:sldId id="300" r:id="rId14"/>
-    <p:sldId id="301" r:id="rId15"/>
-    <p:sldId id="302" r:id="rId16"/>
-    <p:sldId id="303" r:id="rId17"/>
-    <p:sldId id="304" r:id="rId18"/>
-    <p:sldId id="305" r:id="rId19"/>
-    <p:sldId id="297" r:id="rId20"/>
-    <p:sldId id="307" r:id="rId21"/>
-    <p:sldId id="308" r:id="rId22"/>
-    <p:sldId id="309" r:id="rId23"/>
+    <p:sldId id="316" r:id="rId4"/>
+    <p:sldId id="317" r:id="rId5"/>
+    <p:sldId id="318" r:id="rId6"/>
+    <p:sldId id="319" r:id="rId7"/>
+    <p:sldId id="321" r:id="rId8"/>
+    <p:sldId id="322" r:id="rId9"/>
+    <p:sldId id="323" r:id="rId10"/>
+    <p:sldId id="324" r:id="rId11"/>
+    <p:sldId id="315" r:id="rId12"/>
+    <p:sldId id="300" r:id="rId13"/>
+    <p:sldId id="301" r:id="rId14"/>
+    <p:sldId id="302" r:id="rId15"/>
+    <p:sldId id="303" r:id="rId16"/>
+    <p:sldId id="304" r:id="rId17"/>
+    <p:sldId id="305" r:id="rId18"/>
+    <p:sldId id="307" r:id="rId19"/>
+    <p:sldId id="308" r:id="rId20"/>
+    <p:sldId id="309" r:id="rId21"/>
   </p:sldIdLst>
   <p:sldSz cx="9144000" cy="6858000" type="screen4x3"/>
   <p:notesSz cx="6858000" cy="9144000"/>
@@ -3933,14 +3931,7 @@
           <a:bodyPr/>
           <a:lstStyle/>
           <a:p>
-            <a:r>
-              <a:rPr lang="en-US" dirty="0" smtClean="0"/>
-              <a:t>Writing Exercise</a:t>
-            </a:r>
-            <a:br>
-              <a:rPr lang="en-US" dirty="0" smtClean="0"/>
-            </a:br>
-            <a:endParaRPr lang="en-US" dirty="0"/>
+            <a:endParaRPr lang="en-US"/>
           </a:p>
         </p:txBody>
       </p:sp>
@@ -3959,12 +3950,18 @@
           <a:bodyPr/>
           <a:lstStyle/>
           <a:p>
+            <a:r>
+              <a:rPr lang="en-US" dirty="0" smtClean="0"/>
+              <a:t>Exercise:</a:t>
+            </a:r>
+          </a:p>
+          <a:p>
             <a:endParaRPr lang="en-US" dirty="0" smtClean="0"/>
           </a:p>
           <a:p>
             <a:r>
               <a:rPr lang="en-US" dirty="0" smtClean="0"/>
-              <a:t>Feel free to be creative, but aim for the tone of an academic article. </a:t>
+              <a:t>1) Find the most respected journals &amp; conferences that discuss face tracking techniques. Provide examples of papers.</a:t>
             </a:r>
           </a:p>
           <a:p>
@@ -3973,26 +3970,29 @@
           <a:p>
             <a:r>
               <a:rPr lang="en-US" dirty="0" smtClean="0"/>
-              <a:t>Use Google/Google Scholar liberally.</a:t>
-            </a:r>
-          </a:p>
-          <a:p>
-            <a:endParaRPr lang="en-US" dirty="0" smtClean="0"/>
-          </a:p>
-          <a:p>
-            <a:r>
-              <a:rPr lang="en-US" dirty="0" smtClean="0"/>
-              <a:t>Wikipedia is NOT allowed as a reference (although of course you can use it as a jumping off point). </a:t>
-            </a:r>
-          </a:p>
-          <a:p>
-            <a:endParaRPr lang="en-US" dirty="0" smtClean="0"/>
-          </a:p>
-          <a:p>
-            <a:r>
-              <a:rPr lang="en-US" dirty="0" smtClean="0"/>
-              <a:t>You have 15 minutes. Email me your papers.</a:t>
-            </a:r>
+              <a:t>2) </a:t>
+            </a:r>
+            <a:r>
+              <a:rPr lang="en-US" dirty="0" smtClean="0"/>
+              <a:t>Find the most respected journals &amp; conferences that discuss</a:t>
+            </a:r>
+            <a:r>
+              <a:rPr lang="en-US" dirty="0" smtClean="0"/>
+              <a:t> surveillance in an artistic context. </a:t>
+            </a:r>
+            <a:r>
+              <a:rPr lang="en-US" smtClean="0"/>
+              <a:t>Provide examples of papers.</a:t>
+            </a:r>
+            <a:endParaRPr lang="en-US" smtClean="0"/>
+          </a:p>
+          <a:p>
+            <a:r>
+              <a:rPr lang="en-US" dirty="0" smtClean="0"/>
+              <a:t> </a:t>
+            </a:r>
+          </a:p>
+          <a:p>
             <a:endParaRPr lang="en-US" dirty="0"/>
           </a:p>
         </p:txBody>
@@ -4042,11 +4042,8 @@
           <a:p>
             <a:r>
               <a:rPr lang="en-US" dirty="0" smtClean="0"/>
-              <a:t>Writing Exercise</a:t>
-            </a:r>
-            <a:br>
-              <a:rPr lang="en-US" dirty="0" smtClean="0"/>
-            </a:br>
+              <a:t>Presentation Exercise</a:t>
+            </a:r>
             <a:endParaRPr lang="en-US" dirty="0"/>
           </a:p>
         </p:txBody>
@@ -4068,7 +4065,84 @@
           <a:p>
             <a:r>
               <a:rPr lang="en-US" dirty="0" smtClean="0"/>
-              <a:t>4. Pick a new leader, go back to step 2. </a:t>
+              <a:t> </a:t>
+            </a:r>
+          </a:p>
+          <a:p>
+            <a:r>
+              <a:rPr lang="en-US" dirty="0" smtClean="0"/>
+              <a:t>10 </a:t>
+            </a:r>
+            <a:r>
+              <a:rPr lang="en-US" dirty="0" smtClean="0"/>
+              <a:t>minutes to prepare a 3-minute</a:t>
+            </a:r>
+            <a:r>
+              <a:rPr lang="en-US" dirty="0" smtClean="0"/>
+              <a:t> </a:t>
+            </a:r>
+            <a:r>
+              <a:rPr lang="en-US" dirty="0" err="1" smtClean="0"/>
+              <a:t>Powerpoint</a:t>
+            </a:r>
+            <a:r>
+              <a:rPr lang="en-US" dirty="0" smtClean="0"/>
+              <a:t>. Include things such as:</a:t>
+            </a:r>
+          </a:p>
+          <a:p>
+            <a:r>
+              <a:rPr lang="en-US" dirty="0" smtClean="0"/>
+              <a:t>		Your main point, Why </a:t>
+            </a:r>
+            <a:r>
+              <a:rPr lang="en-US" dirty="0" smtClean="0"/>
+              <a:t>it's </a:t>
+            </a:r>
+            <a:r>
+              <a:rPr lang="en-US" dirty="0" smtClean="0"/>
+              <a:t>important, Why </a:t>
+            </a:r>
+            <a:r>
+              <a:rPr lang="en-US" dirty="0" smtClean="0"/>
+              <a:t>audience should </a:t>
+            </a:r>
+            <a:r>
+              <a:rPr lang="en-US" dirty="0" smtClean="0"/>
+              <a:t>care, Quotes, Graphics, Bullet points, etc </a:t>
+            </a:r>
+          </a:p>
+          <a:p>
+            <a:endParaRPr lang="en-US" dirty="0" smtClean="0"/>
+          </a:p>
+          <a:p>
+            <a:r>
+              <a:rPr lang="en-US" dirty="0" smtClean="0"/>
+              <a:t>For </a:t>
+            </a:r>
+            <a:r>
+              <a:rPr lang="en-US" dirty="0" smtClean="0"/>
+              <a:t>the people who are not presenting, evaluate them according to different criteria and explain why you think that criteria is important. </a:t>
+            </a:r>
+            <a:r>
+              <a:rPr lang="en-US" dirty="0" smtClean="0"/>
+              <a:t> </a:t>
+            </a:r>
+            <a:r>
+              <a:rPr lang="en-US" dirty="0" err="1" smtClean="0"/>
+              <a:t>e,g</a:t>
+            </a:r>
+            <a:r>
+              <a:rPr lang="en-US" dirty="0" smtClean="0"/>
+              <a:t>.. </a:t>
+            </a:r>
+            <a:r>
+              <a:rPr lang="en-US" dirty="0" smtClean="0"/>
+              <a:t>relevance, creativity, originality, concept, clarity, speaking</a:t>
+            </a:r>
+            <a:r>
+              <a:rPr lang="en-US" dirty="0" smtClean="0"/>
+              <a:t> prowess... These will be anonymous, btw</a:t>
             </a:r>
             <a:endParaRPr lang="en-US" dirty="0"/>
           </a:p>
@@ -4082,6 +4156,13 @@
   <p:transition spd="slow" advClick="0" advTm="3000">
     <p:fade/>
   </p:transition>
+  <p:timing>
+    <p:tnLst>
+      <p:par>
+        <p:cTn id="1" dur="indefinite" restart="never" nodeType="tmRoot"/>
+      </p:par>
+    </p:tnLst>
+  </p:timing>
 </p:sld>
 </file>
 
@@ -4117,11 +4198,7 @@
           <a:bodyPr/>
           <a:lstStyle/>
           <a:p>
-            <a:r>
-              <a:rPr lang="en-US" dirty="0" smtClean="0"/>
-              <a:t>Presentation Exercise</a:t>
-            </a:r>
-            <a:endParaRPr lang="en-US" dirty="0"/>
+            <a:endParaRPr lang="en-US"/>
           </a:p>
         </p:txBody>
       </p:sp>
@@ -4142,51 +4219,7 @@
           <a:p>
             <a:r>
               <a:rPr lang="en-US" dirty="0" smtClean="0"/>
-              <a:t> </a:t>
-            </a:r>
-          </a:p>
-          <a:p>
-            <a:r>
-              <a:rPr lang="en-US" dirty="0" smtClean="0"/>
-              <a:t>10 </a:t>
-            </a:r>
-            <a:r>
-              <a:rPr lang="en-US" dirty="0" smtClean="0"/>
-              <a:t>minutes to prepare a 3-minute</a:t>
-            </a:r>
-            <a:r>
-              <a:rPr lang="en-US" dirty="0" smtClean="0"/>
-              <a:t> </a:t>
-            </a:r>
-            <a:r>
-              <a:rPr lang="en-US" dirty="0" err="1" smtClean="0"/>
-              <a:t>Powerpoint</a:t>
-            </a:r>
-            <a:r>
-              <a:rPr lang="en-US" dirty="0" smtClean="0"/>
-              <a:t>. Include things such as:</a:t>
-            </a:r>
-          </a:p>
-          <a:p>
-            <a:r>
-              <a:rPr lang="en-US" dirty="0" smtClean="0"/>
-              <a:t>		Your main point, Why </a:t>
-            </a:r>
-            <a:r>
-              <a:rPr lang="en-US" dirty="0" smtClean="0"/>
-              <a:t>it's </a:t>
-            </a:r>
-            <a:r>
-              <a:rPr lang="en-US" dirty="0" smtClean="0"/>
-              <a:t>important, Why </a:t>
-            </a:r>
-            <a:r>
-              <a:rPr lang="en-US" dirty="0" smtClean="0"/>
-              <a:t>audience should </a:t>
-            </a:r>
-            <a:r>
-              <a:rPr lang="en-US" dirty="0" smtClean="0"/>
-              <a:t>care, Quotes, Graphics, Bullet points, etc </a:t>
+              <a:t>Patterns of presentation...</a:t>
             </a:r>
           </a:p>
           <a:p>
@@ -4195,32 +4228,53 @@
           <a:p>
             <a:r>
               <a:rPr lang="en-US" dirty="0" smtClean="0"/>
-              <a:t>For </a:t>
-            </a:r>
-            <a:r>
-              <a:rPr lang="en-US" dirty="0" smtClean="0"/>
-              <a:t>the people who are not presenting, evaluate them according to different criteria and explain why you think that criteria is important. </a:t>
-            </a:r>
-            <a:r>
-              <a:rPr lang="en-US" dirty="0" smtClean="0"/>
-              <a:t> </a:t>
-            </a:r>
-            <a:r>
-              <a:rPr lang="en-US" dirty="0" err="1" smtClean="0"/>
-              <a:t>e,g</a:t>
-            </a:r>
-            <a:r>
-              <a:rPr lang="en-US" dirty="0" smtClean="0"/>
-              <a:t>.. </a:t>
-            </a:r>
-            <a:r>
-              <a:rPr lang="en-US" dirty="0" smtClean="0"/>
-              <a:t>relevance, creativity, originality, concept, clarity, speaking</a:t>
-            </a:r>
-            <a:r>
-              <a:rPr lang="en-US" dirty="0" smtClean="0"/>
-              <a:t> prowess... These will be anonymous, btw</a:t>
-            </a:r>
+              <a:t>Similar to Design Patterns in </a:t>
+            </a:r>
+            <a:r>
+              <a:rPr lang="en-US" dirty="0" smtClean="0"/>
+              <a:t>s</a:t>
+            </a:r>
+            <a:r>
+              <a:rPr lang="en-US" dirty="0" smtClean="0"/>
+              <a:t>oftware engineering.</a:t>
+            </a:r>
+          </a:p>
+          <a:p>
+            <a:endParaRPr lang="en-US" dirty="0" smtClean="0"/>
+          </a:p>
+          <a:p>
+            <a:r>
+              <a:rPr lang="en-US" dirty="0" smtClean="0"/>
+              <a:t>R</a:t>
+            </a:r>
+            <a:r>
+              <a:rPr lang="en-US" dirty="0" smtClean="0"/>
+              <a:t>ead papers in journals in your field.</a:t>
+            </a:r>
+          </a:p>
+          <a:p>
+            <a:r>
+              <a:rPr lang="en-US" dirty="0" smtClean="0"/>
+              <a:t>	</a:t>
+            </a:r>
+            <a:r>
+              <a:rPr lang="en-US" dirty="0" smtClean="0"/>
+              <a:t>How are they framing their arguments?</a:t>
+            </a:r>
+          </a:p>
+          <a:p>
+            <a:endParaRPr lang="en-US" dirty="0" smtClean="0"/>
+          </a:p>
+          <a:p>
+            <a:r>
+              <a:rPr lang="en-US" dirty="0" smtClean="0"/>
+              <a:t>	Claim: There are a finite number of strategies for each field. ... (?)</a:t>
+            </a:r>
+          </a:p>
+          <a:p>
+            <a:endParaRPr lang="en-US" dirty="0" smtClean="0"/>
+          </a:p>
+          <a:p>
             <a:endParaRPr lang="en-US" dirty="0"/>
           </a:p>
         </p:txBody>
@@ -4233,6 +4287,13 @@
   <p:transition spd="slow" advClick="0" advTm="3000">
     <p:fade/>
   </p:transition>
+  <p:timing>
+    <p:tnLst>
+      <p:par>
+        <p:cTn id="1" dur="indefinite" restart="never" nodeType="tmRoot"/>
+      </p:par>
+    </p:tnLst>
+  </p:timing>
 </p:sld>
 </file>
 
@@ -4287,59 +4348,16 @@
           <a:bodyPr/>
           <a:lstStyle/>
           <a:p>
-            <a:r>
-              <a:rPr lang="en-US" dirty="0" smtClean="0"/>
-              <a:t>Patterns of presentation...</a:t>
-            </a:r>
-          </a:p>
-          <a:p>
             <a:endParaRPr lang="en-US" dirty="0" smtClean="0"/>
           </a:p>
           <a:p>
             <a:r>
               <a:rPr lang="en-US" dirty="0" smtClean="0"/>
-              <a:t>Similar to Design Patterns in </a:t>
-            </a:r>
-            <a:r>
-              <a:rPr lang="en-US" dirty="0" smtClean="0"/>
-              <a:t>s</a:t>
-            </a:r>
-            <a:r>
-              <a:rPr lang="en-US" dirty="0" smtClean="0"/>
-              <a:t>oftware engineering.</a:t>
+              <a:t>Homework: skim/read a number of articles and try to identify as many "paper patterns" as you can. Look for overarching patterns as well as specific patterns. Why are these patterns used? Are they effective?</a:t>
             </a:r>
           </a:p>
           <a:p>
             <a:endParaRPr lang="en-US" dirty="0" smtClean="0"/>
-          </a:p>
-          <a:p>
-            <a:r>
-              <a:rPr lang="en-US" dirty="0" smtClean="0"/>
-              <a:t>R</a:t>
-            </a:r>
-            <a:r>
-              <a:rPr lang="en-US" dirty="0" smtClean="0"/>
-              <a:t>ead papers in journals in your field.</a:t>
-            </a:r>
-          </a:p>
-          <a:p>
-            <a:r>
-              <a:rPr lang="en-US" dirty="0" smtClean="0"/>
-              <a:t>	</a:t>
-            </a:r>
-            <a:r>
-              <a:rPr lang="en-US" dirty="0" smtClean="0"/>
-              <a:t>How are they framing their arguments?</a:t>
-            </a:r>
-          </a:p>
-          <a:p>
-            <a:endParaRPr lang="en-US" dirty="0" smtClean="0"/>
-          </a:p>
-          <a:p>
-            <a:r>
-              <a:rPr lang="en-US" dirty="0" smtClean="0"/>
-              <a:t>	Claim: There are a finite number of strategies for each field.</a:t>
-            </a:r>
           </a:p>
           <a:p>
             <a:endParaRPr lang="en-US" dirty="0" smtClean="0"/>
@@ -4357,6 +4375,13 @@
   <p:transition spd="slow" advClick="0" advTm="3000">
     <p:fade/>
   </p:transition>
+  <p:timing>
+    <p:tnLst>
+      <p:par>
+        <p:cTn id="1" dur="indefinite" restart="never" nodeType="tmRoot"/>
+      </p:par>
+    </p:tnLst>
+  </p:timing>
 </p:sld>
 </file>
 
@@ -4416,7 +4441,34 @@
           <a:p>
             <a:r>
               <a:rPr lang="en-US" dirty="0" smtClean="0"/>
-              <a:t>Homework: skim/read a number of articles and try to identify as many "paper patterns" as you can. Look for overarching patterns as well as specific patterns. Why are these patterns used? Are they effective?</a:t>
+              <a:t>Example of overarching pattern: Prototype project as example of potentially interesting research.</a:t>
+            </a:r>
+          </a:p>
+          <a:p>
+            <a:endParaRPr lang="en-US" dirty="0" smtClean="0"/>
+          </a:p>
+          <a:p>
+            <a:r>
+              <a:rPr lang="en-US" dirty="0" smtClean="0"/>
+              <a:t>Why effective? </a:t>
+            </a:r>
+          </a:p>
+          <a:p>
+            <a:endParaRPr lang="en-US" dirty="0" smtClean="0"/>
+          </a:p>
+          <a:p>
+            <a:r>
+              <a:rPr lang="en-US" dirty="0" smtClean="0"/>
+              <a:t>shows that your work is important to other people, has a scope beyond a particular project.</a:t>
+            </a:r>
+          </a:p>
+          <a:p>
+            <a:endParaRPr lang="en-US" dirty="0" smtClean="0"/>
+          </a:p>
+          <a:p>
+            <a:r>
+              <a:rPr lang="en-US" dirty="0" smtClean="0"/>
+              <a:t>takes pressure off of the project details -- it's just an intriguing prototype...</a:t>
             </a:r>
           </a:p>
           <a:p>
@@ -4438,6 +4490,13 @@
   <p:transition spd="slow" advClick="0" advTm="3000">
     <p:fade/>
   </p:transition>
+  <p:timing>
+    <p:tnLst>
+      <p:par>
+        <p:cTn id="1" dur="indefinite" restart="never" nodeType="tmRoot"/>
+      </p:par>
+    </p:tnLst>
+  </p:timing>
 </p:sld>
 </file>
 
@@ -4497,7 +4556,7 @@
           <a:p>
             <a:r>
               <a:rPr lang="en-US" dirty="0" smtClean="0"/>
-              <a:t>Example of overarching pattern: Prototype project as example of potentially interesting research.</a:t>
+              <a:t>Example of specific pattern: Citing previous work and then subtly disparaging it as not being relevant to an important task.</a:t>
             </a:r>
           </a:p>
           <a:p>
@@ -4515,17 +4574,29 @@
           <a:p>
             <a:r>
               <a:rPr lang="en-US" dirty="0" smtClean="0"/>
-              <a:t>shows that your work is important to other people, has a scope beyond a particular project.</a:t>
+              <a:t>Shows you are familiar with the field. </a:t>
+            </a:r>
+          </a:p>
+          <a:p>
+            <a:r>
+              <a:rPr lang="en-US" dirty="0" smtClean="0"/>
+              <a:t>Shows that know why specifically your work is important.</a:t>
+            </a:r>
+          </a:p>
+          <a:p>
+            <a:r>
+              <a:rPr lang="en-US" dirty="0" smtClean="0"/>
+              <a:t>Raises expectations that you will demonstrate relevance.</a:t>
+            </a:r>
+          </a:p>
+          <a:p>
+            <a:r>
+              <a:rPr lang="en-US" dirty="0" smtClean="0"/>
+              <a:t>Creates a narrative interest via implied conflict. (?)</a:t>
             </a:r>
           </a:p>
           <a:p>
             <a:endParaRPr lang="en-US" dirty="0" smtClean="0"/>
-          </a:p>
-          <a:p>
-            <a:r>
-              <a:rPr lang="en-US" dirty="0" smtClean="0"/>
-              <a:t>takes pressure off of the project details -- it's just an intriguing prototype...</a:t>
-            </a:r>
           </a:p>
           <a:p>
             <a:endParaRPr lang="en-US" dirty="0" smtClean="0"/>
@@ -4546,6 +4617,13 @@
   <p:transition spd="slow" advClick="0" advTm="3000">
     <p:fade/>
   </p:transition>
+  <p:timing>
+    <p:tnLst>
+      <p:par>
+        <p:cTn id="1" dur="indefinite" restart="never" nodeType="tmRoot"/>
+      </p:par>
+    </p:tnLst>
+  </p:timing>
 </p:sld>
 </file>
 
@@ -4600,12 +4678,38 @@
           <a:bodyPr/>
           <a:lstStyle/>
           <a:p>
+            <a:r>
+              <a:rPr lang="en-US" dirty="0" smtClean="0"/>
+              <a:t>In Rhetorical Analysis there is the dual concept of </a:t>
+            </a:r>
+          </a:p>
+          <a:p>
             <a:endParaRPr lang="en-US" dirty="0" smtClean="0"/>
           </a:p>
           <a:p>
             <a:r>
               <a:rPr lang="en-US" dirty="0" smtClean="0"/>
-              <a:t>Example of specific pattern: Citing previous work and then subtly disparaging it as not being relevant to an important task.</a:t>
+              <a:t>making a </a:t>
+            </a:r>
+            <a:r>
+              <a:rPr lang="en-US" i="1" dirty="0" smtClean="0"/>
+              <a:t>claim</a:t>
+            </a:r>
+          </a:p>
+          <a:p>
+            <a:r>
+              <a:rPr lang="en-US" dirty="0" smtClean="0"/>
+              <a:t>      which implies </a:t>
+            </a:r>
+          </a:p>
+          <a:p>
+            <a:r>
+              <a:rPr lang="en-US" dirty="0" smtClean="0"/>
+              <a:t>          a </a:t>
+            </a:r>
+            <a:r>
+              <a:rPr lang="en-US" i="1" dirty="0" smtClean="0"/>
+              <a:t>burden of proof</a:t>
             </a:r>
           </a:p>
           <a:p>
@@ -4614,7 +4718,13 @@
           <a:p>
             <a:r>
               <a:rPr lang="en-US" dirty="0" smtClean="0"/>
-              <a:t>Why effective? </a:t>
+              <a:t>What claims are you making? </a:t>
+            </a:r>
+          </a:p>
+          <a:p>
+            <a:r>
+              <a:rPr lang="en-US" dirty="0" smtClean="0"/>
+              <a:t>Why should people care about them?</a:t>
             </a:r>
           </a:p>
           <a:p>
@@ -4623,35 +4733,8 @@
           <a:p>
             <a:r>
               <a:rPr lang="en-US" dirty="0" smtClean="0"/>
-              <a:t>Shows you are familiar with the field. </a:t>
-            </a:r>
-          </a:p>
-          <a:p>
-            <a:r>
-              <a:rPr lang="en-US" dirty="0" smtClean="0"/>
-              <a:t>Shows that know why specifically your work is important.</a:t>
-            </a:r>
-          </a:p>
-          <a:p>
-            <a:r>
-              <a:rPr lang="en-US" dirty="0" smtClean="0"/>
-              <a:t>Raises expectations that you will demonstrate relevance.</a:t>
-            </a:r>
-          </a:p>
-          <a:p>
-            <a:r>
-              <a:rPr lang="en-US" dirty="0" smtClean="0"/>
-              <a:t>Creates a narrative interest via implied conflict. (?)</a:t>
-            </a:r>
-          </a:p>
-          <a:p>
-            <a:endParaRPr lang="en-US" dirty="0" smtClean="0"/>
-          </a:p>
-          <a:p>
-            <a:endParaRPr lang="en-US" dirty="0" smtClean="0"/>
-          </a:p>
-          <a:p>
-            <a:endParaRPr lang="en-US" dirty="0" smtClean="0"/>
+              <a:t>How can you back them up?</a:t>
+            </a:r>
           </a:p>
           <a:p>
             <a:endParaRPr lang="en-US" dirty="0"/>
@@ -4666,6 +4749,13 @@
   <p:transition spd="slow" advClick="0" advTm="3000">
     <p:fade/>
   </p:transition>
+  <p:timing>
+    <p:tnLst>
+      <p:par>
+        <p:cTn id="1" dur="indefinite" restart="never" nodeType="tmRoot"/>
+      </p:par>
+    </p:tnLst>
+  </p:timing>
 </p:sld>
 </file>
 
@@ -4722,61 +4812,68 @@
           <a:p>
             <a:r>
               <a:rPr lang="en-US" dirty="0" smtClean="0"/>
-              <a:t>In Rhetorical Analysis there is the dual concept of </a:t>
+              <a:t>empirical studies</a:t>
+            </a:r>
+          </a:p>
+          <a:p>
+            <a:r>
+              <a:rPr lang="en-US" dirty="0" smtClean="0"/>
+              <a:t>logic</a:t>
+            </a:r>
+          </a:p>
+          <a:p>
+            <a:r>
+              <a:rPr lang="en-US" dirty="0" smtClean="0"/>
+              <a:t>quotes, citations</a:t>
+            </a:r>
+          </a:p>
+          <a:p>
+            <a:r>
+              <a:rPr lang="en-US" dirty="0" smtClean="0"/>
+              <a:t>charts</a:t>
+            </a:r>
+          </a:p>
+          <a:p>
+            <a:r>
+              <a:rPr lang="en-US" dirty="0" smtClean="0"/>
+              <a:t>images</a:t>
+            </a:r>
+          </a:p>
+          <a:p>
+            <a:r>
+              <a:rPr lang="en-US" dirty="0" smtClean="0"/>
+              <a:t>language tone (formal, jargon, amusing... etc)</a:t>
+            </a:r>
+          </a:p>
+          <a:p>
+            <a:r>
+              <a:rPr lang="en-US" dirty="0" smtClean="0"/>
+              <a:t>compare/contrast</a:t>
+            </a:r>
+          </a:p>
+          <a:p>
+            <a:r>
+              <a:rPr lang="en-US" dirty="0" smtClean="0"/>
+              <a:t>breadth/depth of analysis</a:t>
+            </a:r>
+          </a:p>
+          <a:p>
+            <a:r>
+              <a:rPr lang="en-US" dirty="0" smtClean="0"/>
+              <a:t>analogy, metaphor</a:t>
+            </a:r>
+          </a:p>
+          <a:p>
+            <a:r>
+              <a:rPr lang="en-US" dirty="0" smtClean="0"/>
+              <a:t>etc...</a:t>
             </a:r>
           </a:p>
           <a:p>
             <a:endParaRPr lang="en-US" dirty="0" smtClean="0"/>
           </a:p>
           <a:p>
-            <a:r>
-              <a:rPr lang="en-US" dirty="0" smtClean="0"/>
-              <a:t>making a </a:t>
-            </a:r>
-            <a:r>
-              <a:rPr lang="en-US" i="1" dirty="0" smtClean="0"/>
-              <a:t>claim</a:t>
-            </a:r>
-          </a:p>
-          <a:p>
-            <a:r>
-              <a:rPr lang="en-US" dirty="0" smtClean="0"/>
-              <a:t>      which implies </a:t>
-            </a:r>
-          </a:p>
-          <a:p>
-            <a:r>
-              <a:rPr lang="en-US" dirty="0" smtClean="0"/>
-              <a:t>          a </a:t>
-            </a:r>
-            <a:r>
-              <a:rPr lang="en-US" i="1" dirty="0" smtClean="0"/>
-              <a:t>burden of proof</a:t>
-            </a:r>
-          </a:p>
-          <a:p>
             <a:endParaRPr lang="en-US" dirty="0" smtClean="0"/>
-          </a:p>
-          <a:p>
-            <a:r>
-              <a:rPr lang="en-US" dirty="0" smtClean="0"/>
-              <a:t>What claims are you making? </a:t>
-            </a:r>
-          </a:p>
-          <a:p>
-            <a:r>
-              <a:rPr lang="en-US" dirty="0" smtClean="0"/>
-              <a:t>Why should people care about them?</a:t>
-            </a:r>
-          </a:p>
-          <a:p>
-            <a:endParaRPr lang="en-US" dirty="0" smtClean="0"/>
-          </a:p>
-          <a:p>
-            <a:r>
-              <a:rPr lang="en-US" dirty="0" smtClean="0"/>
-              <a:t>How can you back them up?</a:t>
-            </a:r>
           </a:p>
           <a:p>
             <a:endParaRPr lang="en-US" dirty="0"/>
@@ -4791,6 +4888,13 @@
   <p:transition spd="slow" advClick="0" advTm="3000">
     <p:fade/>
   </p:transition>
+  <p:timing>
+    <p:tnLst>
+      <p:par>
+        <p:cTn id="1" dur="indefinite" restart="never" nodeType="tmRoot"/>
+      </p:par>
+    </p:tnLst>
+  </p:timing>
 </p:sld>
 </file>
 
@@ -4847,70 +4951,42 @@
           <a:p>
             <a:r>
               <a:rPr lang="en-US" dirty="0" smtClean="0"/>
-              <a:t>empirical studies</a:t>
-            </a:r>
-          </a:p>
-          <a:p>
-            <a:r>
-              <a:rPr lang="en-US" dirty="0" smtClean="0"/>
-              <a:t>logic</a:t>
-            </a:r>
-          </a:p>
-          <a:p>
-            <a:r>
-              <a:rPr lang="en-US" dirty="0" smtClean="0"/>
-              <a:t>quotes, citations</a:t>
-            </a:r>
-          </a:p>
-          <a:p>
-            <a:r>
-              <a:rPr lang="en-US" dirty="0" smtClean="0"/>
-              <a:t>charts</a:t>
-            </a:r>
-          </a:p>
-          <a:p>
-            <a:r>
-              <a:rPr lang="en-US" dirty="0" smtClean="0"/>
-              <a:t>images</a:t>
-            </a:r>
-          </a:p>
-          <a:p>
-            <a:r>
-              <a:rPr lang="en-US" dirty="0" smtClean="0"/>
-              <a:t>language tone (formal, jargon, amusing... etc)</a:t>
-            </a:r>
-          </a:p>
-          <a:p>
-            <a:r>
-              <a:rPr lang="en-US" dirty="0" smtClean="0"/>
-              <a:t>compare/contrast</a:t>
-            </a:r>
-          </a:p>
-          <a:p>
-            <a:r>
-              <a:rPr lang="en-US" dirty="0" smtClean="0"/>
-              <a:t>breadth/depth of analysis</a:t>
-            </a:r>
-          </a:p>
-          <a:p>
-            <a:r>
-              <a:rPr lang="en-US" dirty="0" smtClean="0"/>
-              <a:t>analogy, metaphor</a:t>
-            </a:r>
-          </a:p>
-          <a:p>
-            <a:r>
-              <a:rPr lang="en-US" dirty="0" smtClean="0"/>
-              <a:t>etc...</a:t>
+              <a:t>Homework</a:t>
             </a:r>
           </a:p>
           <a:p>
             <a:endParaRPr lang="en-US" dirty="0" smtClean="0"/>
           </a:p>
           <a:p>
+            <a:r>
+              <a:rPr lang="en-US" dirty="0" smtClean="0"/>
+              <a:t>1) find 10 "paper patterns" (both general and specific) from articles of your choice in fields you are interested in. Write a blog post describing them. Are they effective? Why or why not? Are they common? Are they only found in particular kinds of papers or particular fields? Cite and link to the papers you've skimmed/read.</a:t>
+            </a:r>
+          </a:p>
+          <a:p>
             <a:endParaRPr lang="en-US" dirty="0" smtClean="0"/>
           </a:p>
           <a:p>
+            <a:r>
+              <a:rPr lang="en-US" dirty="0" smtClean="0"/>
+              <a:t>1b) Bring to class 3 interesting papers that are less than 10 pages each. Print them out on PAPER and provide LINKS to a complete digital copy (</a:t>
+            </a:r>
+            <a:r>
+              <a:rPr lang="en-US" dirty="0" err="1" smtClean="0"/>
+              <a:t>ie</a:t>
+            </a:r>
+            <a:r>
+              <a:rPr lang="en-US" dirty="0" smtClean="0"/>
+              <a:t>, not behind a </a:t>
+            </a:r>
+            <a:r>
+              <a:rPr lang="en-US" dirty="0" err="1" smtClean="0"/>
+              <a:t>paywall</a:t>
+            </a:r>
+            <a:r>
+              <a:rPr lang="en-US" dirty="0" smtClean="0"/>
+              <a:t>). </a:t>
+            </a:r>
             <a:endParaRPr lang="en-US" dirty="0"/>
           </a:p>
         </p:txBody>
@@ -4923,6 +4999,13 @@
   <p:transition spd="slow" advClick="0" advTm="3000">
     <p:fade/>
   </p:transition>
+  <p:timing>
+    <p:tnLst>
+      <p:par>
+        <p:cTn id="1" dur="indefinite" restart="never" nodeType="tmRoot"/>
+      </p:par>
+    </p:tnLst>
+  </p:timing>
 </p:sld>
 </file>
 
@@ -4979,29 +5062,45 @@
           <a:p>
             <a:r>
               <a:rPr lang="en-US" dirty="0" smtClean="0"/>
-              <a:t>Javier: http</a:t>
-            </a:r>
-            <a:r>
-              <a:rPr lang="en-US" dirty="0" smtClean="0"/>
-              <a:t>://</a:t>
+              <a:t>Homework</a:t>
+            </a:r>
+          </a:p>
+          <a:p>
+            <a:r>
+              <a:rPr lang="en-US" dirty="0" smtClean="0"/>
+              <a:t>2) Use your analytical skills to uncover the implicit or explicit philosophies of a particular author of an article. What is important/meaningful to the </a:t>
             </a:r>
             <a:r>
               <a:rPr lang="en-US" dirty="0" err="1" smtClean="0"/>
-              <a:t>www.wikicfp.com/cfp</a:t>
-            </a:r>
-            <a:r>
-              <a:rPr lang="en-US" dirty="0" smtClean="0"/>
-              <a:t>/</a:t>
+              <a:t>author(s</a:t>
+            </a:r>
+            <a:r>
+              <a:rPr lang="en-US" dirty="0" smtClean="0"/>
+              <a:t>)? Why are they important/meaningful to the </a:t>
+            </a:r>
+            <a:r>
+              <a:rPr lang="en-US" dirty="0" err="1" smtClean="0"/>
+              <a:t>author(s</a:t>
+            </a:r>
+            <a:r>
+              <a:rPr lang="en-US" dirty="0" smtClean="0"/>
+              <a:t>)? </a:t>
+            </a:r>
+          </a:p>
+          <a:p>
+            <a:r>
+              <a:rPr lang="en-US" dirty="0" smtClean="0"/>
+              <a:t>Where in the article do you find it? What citations support your findings? What is the relationship between the philosophy and the field in general?</a:t>
+            </a:r>
+          </a:p>
+          <a:p>
+            <a:r>
+              <a:rPr lang="en-US" dirty="0" smtClean="0"/>
+              <a:t>Do you agree with the "tenets" of the author's outlook?</a:t>
             </a:r>
           </a:p>
           <a:p>
             <a:endParaRPr lang="en-US" dirty="0" smtClean="0"/>
-          </a:p>
-          <a:p>
-            <a:endParaRPr lang="en-US" dirty="0" smtClean="0"/>
-          </a:p>
-          <a:p>
-            <a:endParaRPr lang="en-US" dirty="0"/>
           </a:p>
         </p:txBody>
       </p:sp>
@@ -5013,6 +5112,13 @@
   <p:transition spd="slow" advClick="0" advTm="3000">
     <p:fade/>
   </p:transition>
+  <p:timing>
+    <p:tnLst>
+      <p:par>
+        <p:cTn id="1" dur="indefinite" restart="never" nodeType="tmRoot"/>
+      </p:par>
+    </p:tnLst>
+  </p:timing>
 </p:sld>
 </file>
 
@@ -5078,38 +5184,22 @@
           <a:p>
             <a:r>
               <a:rPr lang="en-US" dirty="0" smtClean="0"/>
-              <a:t>	1. </a:t>
-            </a:r>
-            <a:r>
-              <a:rPr lang="en-US" dirty="0" smtClean="0"/>
-              <a:t>Abstracts from last week</a:t>
-            </a:r>
-          </a:p>
-          <a:p>
-            <a:r>
-              <a:rPr lang="en-US" dirty="0" smtClean="0"/>
-              <a:t>	</a:t>
-            </a:r>
-            <a:r>
-              <a:rPr lang="en-US" dirty="0" smtClean="0"/>
-              <a:t>2</a:t>
-            </a:r>
-            <a:r>
-              <a:rPr lang="en-US" dirty="0" smtClean="0"/>
-              <a:t>. Writing exercise</a:t>
-            </a:r>
-          </a:p>
-          <a:p>
-            <a:r>
-              <a:rPr lang="en-US" dirty="0" smtClean="0"/>
-              <a:t>	3. Presentation exercise</a:t>
-            </a:r>
+              <a:t>	1. please email me the 15 minute papers from last class</a:t>
+            </a:r>
+          </a:p>
+          <a:p>
+            <a:r>
+              <a:rPr lang="en-US" dirty="0" smtClean="0"/>
+              <a:t>	2. how to find papers</a:t>
+            </a:r>
+          </a:p>
+          <a:p>
             <a:endParaRPr lang="en-US" dirty="0" smtClean="0"/>
           </a:p>
           <a:p>
             <a:r>
               <a:rPr lang="en-US" dirty="0" smtClean="0"/>
-              <a:t>	4. Philosophy homework</a:t>
+              <a:t>	3. summarization exercises</a:t>
             </a:r>
             <a:endParaRPr lang="en-US" dirty="0"/>
           </a:p>
@@ -5186,216 +5276,6 @@
           <a:p>
             <a:r>
               <a:rPr lang="en-US" dirty="0" smtClean="0"/>
-              <a:t>Homework</a:t>
-            </a:r>
-          </a:p>
-          <a:p>
-            <a:endParaRPr lang="en-US" dirty="0" smtClean="0"/>
-          </a:p>
-          <a:p>
-            <a:r>
-              <a:rPr lang="en-US" dirty="0" smtClean="0"/>
-              <a:t>1) find 10 "paper patterns" (both general and specific) from articles of your choice in fields you are interested in. Write a blog post describing them. Are they effective? Why or why not? Are they common? Are they only found in particular kinds of papers or particular fields? Cite and link to the papers you've skimmed/read.</a:t>
-            </a:r>
-          </a:p>
-          <a:p>
-            <a:endParaRPr lang="en-US" dirty="0" smtClean="0"/>
-          </a:p>
-          <a:p>
-            <a:r>
-              <a:rPr lang="en-US" dirty="0" smtClean="0"/>
-              <a:t>1b) Bring to class 3 interesting papers that are less than 10 pages each. Print them out on PAPER and provide LINKS to a complete digital copy (</a:t>
-            </a:r>
-            <a:r>
-              <a:rPr lang="en-US" dirty="0" err="1" smtClean="0"/>
-              <a:t>ie</a:t>
-            </a:r>
-            <a:r>
-              <a:rPr lang="en-US" dirty="0" smtClean="0"/>
-              <a:t>, not behind a </a:t>
-            </a:r>
-            <a:r>
-              <a:rPr lang="en-US" dirty="0" err="1" smtClean="0"/>
-              <a:t>paywall</a:t>
-            </a:r>
-            <a:r>
-              <a:rPr lang="en-US" dirty="0" smtClean="0"/>
-              <a:t>). </a:t>
-            </a:r>
-            <a:endParaRPr lang="en-US" dirty="0"/>
-          </a:p>
-        </p:txBody>
-      </p:sp>
-    </p:spTree>
-  </p:cSld>
-  <p:clrMapOvr>
-    <a:masterClrMapping/>
-  </p:clrMapOvr>
-  <p:transition spd="slow" advClick="0" advTm="3000">
-    <p:fade/>
-  </p:transition>
-</p:sld>
-</file>
-
-<file path=ppt/slides/slide21.xml><?xml version="1.0" encoding="utf-8"?>
-<p:sld xmlns:a="http://schemas.openxmlformats.org/drawingml/2006/main" xmlns:r="http://schemas.openxmlformats.org/officeDocument/2006/relationships" xmlns:mc="http://schemas.openxmlformats.org/markup-compatibility/2006" xmlns:mv="urn:schemas-microsoft-com:mac:vml" xmlns:p="http://schemas.openxmlformats.org/presentationml/2006/main" mc:Ignorable="mv" mc:PreserveAttributes="mv:*">
-  <p:cSld>
-    <p:spTree>
-      <p:nvGrpSpPr>
-        <p:cNvPr id="1" name=""/>
-        <p:cNvGrpSpPr/>
-        <p:nvPr/>
-      </p:nvGrpSpPr>
-      <p:grpSpPr>
-        <a:xfrm>
-          <a:off x="0" y="0"/>
-          <a:ext cx="0" cy="0"/>
-          <a:chOff x="0" y="0"/>
-          <a:chExt cx="0" cy="0"/>
-        </a:xfrm>
-      </p:grpSpPr>
-      <p:sp>
-        <p:nvSpPr>
-          <p:cNvPr id="2" name="Title 1"/>
-          <p:cNvSpPr>
-            <a:spLocks noGrp="1"/>
-          </p:cNvSpPr>
-          <p:nvPr>
-            <p:ph type="title"/>
-          </p:nvPr>
-        </p:nvSpPr>
-        <p:spPr/>
-        <p:txBody>
-          <a:bodyPr/>
-          <a:lstStyle/>
-          <a:p>
-            <a:endParaRPr lang="en-US"/>
-          </a:p>
-        </p:txBody>
-      </p:sp>
-      <p:sp>
-        <p:nvSpPr>
-          <p:cNvPr id="3" name="Content Placeholder 2"/>
-          <p:cNvSpPr>
-            <a:spLocks noGrp="1"/>
-          </p:cNvSpPr>
-          <p:nvPr>
-            <p:ph idx="1"/>
-          </p:nvPr>
-        </p:nvSpPr>
-        <p:spPr/>
-        <p:txBody>
-          <a:bodyPr/>
-          <a:lstStyle/>
-          <a:p>
-            <a:r>
-              <a:rPr lang="en-US" dirty="0" smtClean="0"/>
-              <a:t>Homework</a:t>
-            </a:r>
-          </a:p>
-          <a:p>
-            <a:r>
-              <a:rPr lang="en-US" dirty="0" smtClean="0"/>
-              <a:t>2) Use your analytical skills to uncover the implicit or explicit philosophies of a particular author of an article. What is important/meaningful to the </a:t>
-            </a:r>
-            <a:r>
-              <a:rPr lang="en-US" dirty="0" err="1" smtClean="0"/>
-              <a:t>author(s</a:t>
-            </a:r>
-            <a:r>
-              <a:rPr lang="en-US" dirty="0" smtClean="0"/>
-              <a:t>)? Why are they important/meaningful to the </a:t>
-            </a:r>
-            <a:r>
-              <a:rPr lang="en-US" dirty="0" err="1" smtClean="0"/>
-              <a:t>author(s</a:t>
-            </a:r>
-            <a:r>
-              <a:rPr lang="en-US" dirty="0" smtClean="0"/>
-              <a:t>)? </a:t>
-            </a:r>
-          </a:p>
-          <a:p>
-            <a:r>
-              <a:rPr lang="en-US" dirty="0" smtClean="0"/>
-              <a:t>Where in the article do you find it? What citations support your findings? What is the relationship between the philosophy and the field in general?</a:t>
-            </a:r>
-          </a:p>
-          <a:p>
-            <a:r>
-              <a:rPr lang="en-US" dirty="0" smtClean="0"/>
-              <a:t>Do you agree with the "tenets" of the author's outlook?</a:t>
-            </a:r>
-          </a:p>
-          <a:p>
-            <a:endParaRPr lang="en-US" dirty="0" smtClean="0"/>
-          </a:p>
-        </p:txBody>
-      </p:sp>
-    </p:spTree>
-  </p:cSld>
-  <p:clrMapOvr>
-    <a:masterClrMapping/>
-  </p:clrMapOvr>
-  <p:transition spd="slow" advClick="0" advTm="3000">
-    <p:fade/>
-  </p:transition>
-</p:sld>
-</file>
-
-<file path=ppt/slides/slide22.xml><?xml version="1.0" encoding="utf-8"?>
-<p:sld xmlns:a="http://schemas.openxmlformats.org/drawingml/2006/main" xmlns:r="http://schemas.openxmlformats.org/officeDocument/2006/relationships" xmlns:mc="http://schemas.openxmlformats.org/markup-compatibility/2006" xmlns:mv="urn:schemas-microsoft-com:mac:vml" xmlns:p="http://schemas.openxmlformats.org/presentationml/2006/main" mc:Ignorable="mv" mc:PreserveAttributes="mv:*">
-  <p:cSld>
-    <p:spTree>
-      <p:nvGrpSpPr>
-        <p:cNvPr id="1" name=""/>
-        <p:cNvGrpSpPr/>
-        <p:nvPr/>
-      </p:nvGrpSpPr>
-      <p:grpSpPr>
-        <a:xfrm>
-          <a:off x="0" y="0"/>
-          <a:ext cx="0" cy="0"/>
-          <a:chOff x="0" y="0"/>
-          <a:chExt cx="0" cy="0"/>
-        </a:xfrm>
-      </p:grpSpPr>
-      <p:sp>
-        <p:nvSpPr>
-          <p:cNvPr id="2" name="Title 1"/>
-          <p:cNvSpPr>
-            <a:spLocks noGrp="1"/>
-          </p:cNvSpPr>
-          <p:nvPr>
-            <p:ph type="title"/>
-          </p:nvPr>
-        </p:nvSpPr>
-        <p:spPr/>
-        <p:txBody>
-          <a:bodyPr/>
-          <a:lstStyle/>
-          <a:p>
-            <a:endParaRPr lang="en-US"/>
-          </a:p>
-        </p:txBody>
-      </p:sp>
-      <p:sp>
-        <p:nvSpPr>
-          <p:cNvPr id="3" name="Content Placeholder 2"/>
-          <p:cNvSpPr>
-            <a:spLocks noGrp="1"/>
-          </p:cNvSpPr>
-          <p:nvPr>
-            <p:ph idx="1"/>
-          </p:nvPr>
-        </p:nvSpPr>
-        <p:spPr/>
-        <p:txBody>
-          <a:bodyPr/>
-          <a:lstStyle/>
-          <a:p>
-            <a:r>
-              <a:rPr lang="en-US" dirty="0" smtClean="0"/>
               <a:t>Homework  2 cont) </a:t>
             </a:r>
           </a:p>
@@ -5497,7 +5377,7 @@
           <a:p>
             <a:r>
               <a:rPr lang="en-US" dirty="0" smtClean="0"/>
-              <a:t>1. Abstracts</a:t>
+              <a:t>1. Usually easier to start with a particular journal or particular article.</a:t>
             </a:r>
           </a:p>
           <a:p>
@@ -5506,194 +5386,20 @@
           <a:p>
             <a:r>
               <a:rPr lang="en-US" dirty="0" smtClean="0"/>
-              <a:t>very impressive, could tell that you all put a lot of work into it!</a:t>
-            </a:r>
-          </a:p>
-          <a:p>
-            <a:endParaRPr lang="en-US" dirty="0" smtClean="0"/>
-          </a:p>
-          <a:p>
-            <a:r>
-              <a:rPr lang="en-US" sz="1600" dirty="0" smtClean="0"/>
-              <a:t>"Proposal </a:t>
-            </a:r>
-            <a:r>
-              <a:rPr lang="en-US" sz="1600" dirty="0" smtClean="0"/>
-              <a:t>for Long-Term Education Profile and Spaced Repetition System and Its Affect on </a:t>
-            </a:r>
-            <a:r>
-              <a:rPr lang="en-US" sz="1600" dirty="0" smtClean="0"/>
-              <a:t>Society"</a:t>
-            </a:r>
-          </a:p>
-          <a:p>
-            <a:r>
-              <a:rPr lang="en-US" sz="1600" dirty="0" smtClean="0"/>
-              <a:t>"Twitter </a:t>
-            </a:r>
-            <a:r>
-              <a:rPr lang="en-US" sz="1600" dirty="0" smtClean="0"/>
-              <a:t>as Cheap Fortune </a:t>
-            </a:r>
-            <a:r>
-              <a:rPr lang="en-US" sz="1600" dirty="0" smtClean="0"/>
-              <a:t>Teller"</a:t>
-            </a:r>
-          </a:p>
-          <a:p>
-            <a:r>
-              <a:rPr lang="en-US" sz="1600" dirty="0" smtClean="0"/>
-              <a:t>"PDA </a:t>
-            </a:r>
-            <a:r>
-              <a:rPr lang="en-US" sz="1600" dirty="0" smtClean="0"/>
-              <a:t>Helping you Score a Little PDA: the Future of Habit Tracking and Suggestion </a:t>
-            </a:r>
-            <a:r>
-              <a:rPr lang="en-US" sz="1600" dirty="0" smtClean="0"/>
-              <a:t>Engines"</a:t>
-            </a:r>
-          </a:p>
-          <a:p>
-            <a:r>
-              <a:rPr lang="en-US" sz="1600" dirty="0" smtClean="0"/>
-              <a:t>"Heavy Data is Hardly Heavy:</a:t>
-            </a:r>
-            <a:r>
-              <a:rPr lang="en-US" sz="1600" dirty="0" smtClean="0"/>
-              <a:t> The </a:t>
-            </a:r>
-            <a:r>
-              <a:rPr lang="en-US" sz="1600" dirty="0" smtClean="0"/>
-              <a:t>Material of Information </a:t>
-            </a:r>
-            <a:r>
-              <a:rPr lang="en-US" sz="1600" dirty="0" smtClean="0"/>
-              <a:t>Space"</a:t>
-            </a:r>
-          </a:p>
-          <a:p>
-            <a:r>
-              <a:rPr lang="en-US" sz="1600" dirty="0" smtClean="0"/>
-              <a:t>"Dynamic Use of the </a:t>
-            </a:r>
-            <a:r>
-              <a:rPr lang="en-US" sz="1600" dirty="0" err="1" smtClean="0"/>
-              <a:t>McCollogh</a:t>
-            </a:r>
-            <a:r>
-              <a:rPr lang="en-US" sz="1600" dirty="0" smtClean="0"/>
-              <a:t> Effect: Color, Space &amp; </a:t>
-            </a:r>
-            <a:r>
-              <a:rPr lang="en-US" sz="1600" dirty="0" smtClean="0"/>
-              <a:t>Psychedelics"</a:t>
-            </a:r>
-          </a:p>
-          <a:p>
-            <a:r>
-              <a:rPr lang="en-US" sz="1600" dirty="0" smtClean="0"/>
-              <a:t>"Binaural Tones: Isotonic Beats as Spatial </a:t>
-            </a:r>
-            <a:r>
-              <a:rPr lang="en-US" sz="1600" dirty="0" smtClean="0"/>
-              <a:t>Navigation"</a:t>
-            </a:r>
-          </a:p>
-          <a:p>
-            <a:r>
-              <a:rPr lang="en-US" sz="1600" dirty="0" smtClean="0"/>
-              <a:t>"Enhanced </a:t>
-            </a:r>
-            <a:r>
-              <a:rPr lang="en-US" sz="1600" dirty="0" err="1" smtClean="0"/>
-              <a:t>Decorrelated</a:t>
-            </a:r>
-            <a:r>
-              <a:rPr lang="en-US" sz="1600" dirty="0" smtClean="0"/>
-              <a:t> Audio </a:t>
-            </a:r>
-            <a:r>
-              <a:rPr lang="en-US" sz="1600" dirty="0" err="1" smtClean="0"/>
-              <a:t>Upmixing</a:t>
-            </a:r>
-            <a:r>
-              <a:rPr lang="en-US" sz="1600" dirty="0" smtClean="0"/>
-              <a:t> Through </a:t>
-            </a:r>
-            <a:r>
-              <a:rPr lang="en-US" sz="1600" dirty="0" err="1" smtClean="0"/>
-              <a:t>Spatialization</a:t>
-            </a:r>
-            <a:r>
-              <a:rPr lang="en-US" sz="1600" dirty="0" smtClean="0"/>
-              <a:t>"</a:t>
-            </a:r>
-          </a:p>
-          <a:p>
-            <a:r>
-              <a:rPr lang="en-US" sz="1600" dirty="0" smtClean="0"/>
-              <a:t>"Existential Moments in a Digital Age: What Does It All </a:t>
-            </a:r>
-            <a:r>
-              <a:rPr lang="en-US" sz="1600" dirty="0" smtClean="0"/>
-              <a:t>M</a:t>
-            </a:r>
-            <a:r>
-              <a:rPr lang="en-US" sz="1600" dirty="0" smtClean="0"/>
-              <a:t>ean?"</a:t>
-            </a:r>
-          </a:p>
-          <a:p>
-            <a:r>
-              <a:rPr lang="en-US" sz="1600" dirty="0" smtClean="0"/>
-              <a:t>"How Apt is that App?"</a:t>
-            </a:r>
-          </a:p>
-          <a:p>
-            <a:r>
-              <a:rPr lang="en-US" sz="1600" dirty="0" smtClean="0"/>
-              <a:t>"The Infinite Band: Generative Song Forms and </a:t>
-            </a:r>
-            <a:r>
-              <a:rPr lang="en-US" sz="1600" dirty="0" smtClean="0"/>
-              <a:t>Structures"</a:t>
-            </a:r>
-          </a:p>
-          <a:p>
-            <a:r>
-              <a:rPr lang="en-US" sz="1600" dirty="0" smtClean="0"/>
-              <a:t>"The Art of BS"</a:t>
-            </a:r>
-          </a:p>
-          <a:p>
-            <a:endParaRPr lang="en-US" sz="1200" dirty="0" smtClean="0"/>
-          </a:p>
-          <a:p>
-            <a:endParaRPr lang="en-US" sz="1200" dirty="0" smtClean="0"/>
-          </a:p>
-          <a:p>
-            <a:endParaRPr lang="en-US" sz="1200" dirty="0" smtClean="0"/>
-          </a:p>
-          <a:p>
-            <a:endParaRPr lang="en-US" sz="1200" dirty="0" smtClean="0"/>
-          </a:p>
-          <a:p>
-            <a:endParaRPr lang="en-US" sz="1200" dirty="0" smtClean="0"/>
-          </a:p>
-          <a:p>
-            <a:endParaRPr lang="en-US" sz="1200" dirty="0" smtClean="0"/>
-          </a:p>
-          <a:p>
-            <a:endParaRPr lang="en-US" dirty="0" smtClean="0"/>
-          </a:p>
-          <a:p>
-            <a:endParaRPr lang="en-US" dirty="0" smtClean="0"/>
-          </a:p>
-          <a:p>
-            <a:endParaRPr lang="en-US" dirty="0" smtClean="0"/>
-          </a:p>
-          <a:p>
+              <a:t>- identify unusual phrases, jargon that indicates a sub-field of interest</a:t>
+            </a:r>
+          </a:p>
+          <a:p>
+            <a:r>
+              <a:rPr lang="en-US" dirty="0" smtClean="0"/>
+              <a:t>- most technical papers require a detailed related work section, so can work backward from there</a:t>
+            </a:r>
+          </a:p>
+          <a:p>
+            <a:r>
+              <a:rPr lang="en-US" dirty="0" smtClean="0"/>
+              <a:t>- many conferences have their proceedings online (everyone should do this... online papers are cited more often)</a:t>
+            </a:r>
             <a:endParaRPr lang="en-US" dirty="0"/>
           </a:p>
         </p:txBody>
@@ -5762,34 +5468,111 @@
           <a:p>
             <a:r>
               <a:rPr lang="en-US" dirty="0" smtClean="0"/>
-              <a:t>Overall thoughts...</a:t>
-            </a:r>
-          </a:p>
-          <a:p>
+              <a:t>UCSB Library </a:t>
+            </a:r>
+            <a:r>
+              <a:rPr lang="en-US" dirty="0" err="1" smtClean="0">
+                <a:sym typeface="Wingdings"/>
+              </a:rPr>
+              <a:t></a:t>
+            </a:r>
+            <a:r>
+              <a:rPr lang="en-US" dirty="0" smtClean="0">
+                <a:sym typeface="Wingdings"/>
+              </a:rPr>
+              <a:t> off-campus access</a:t>
+            </a:r>
             <a:endParaRPr lang="en-US" dirty="0" smtClean="0"/>
           </a:p>
           <a:p>
-            <a:r>
-              <a:rPr lang="en-US" dirty="0" smtClean="0"/>
-              <a:t>the goal of the assignment was </a:t>
-            </a:r>
-          </a:p>
-          <a:p>
-            <a:r>
-              <a:rPr lang="en-US" dirty="0" smtClean="0"/>
-              <a:t>1) to get you to brainstorm about your existing work and how to frame it for a particular audience</a:t>
-            </a:r>
-          </a:p>
-          <a:p>
-            <a:r>
-              <a:rPr lang="en-US" dirty="0" smtClean="0"/>
-              <a:t>2) to read articles in journals and to start to get a sense of the tone/jargon/themes they used</a:t>
-            </a:r>
-          </a:p>
-          <a:p>
-            <a:r>
-              <a:rPr lang="en-US" dirty="0" smtClean="0"/>
-              <a:t>3) to mimic the language of abstracts for particular journals   </a:t>
+            <a:endParaRPr lang="en-US" dirty="0" smtClean="0"/>
+          </a:p>
+          <a:p>
+            <a:r>
+              <a:rPr lang="en-US" dirty="0" smtClean="0"/>
+              <a:t>UCSB Library </a:t>
+            </a:r>
+            <a:r>
+              <a:rPr lang="en-US" dirty="0" err="1" smtClean="0">
+                <a:sym typeface="Wingdings"/>
+              </a:rPr>
+              <a:t></a:t>
+            </a:r>
+            <a:r>
+              <a:rPr lang="en-US" dirty="0" smtClean="0">
+                <a:sym typeface="Wingdings"/>
+              </a:rPr>
+              <a:t> Article Database</a:t>
+            </a:r>
+          </a:p>
+          <a:p>
+            <a:r>
+              <a:rPr lang="en-US" dirty="0" smtClean="0">
+                <a:sym typeface="Wingdings"/>
+              </a:rPr>
+              <a:t>	ACM Digital Library</a:t>
+            </a:r>
+          </a:p>
+          <a:p>
+            <a:r>
+              <a:rPr lang="en-US" dirty="0" smtClean="0">
+                <a:sym typeface="Wingdings"/>
+              </a:rPr>
+              <a:t>	IEEE </a:t>
+            </a:r>
+            <a:r>
+              <a:rPr lang="en-US" dirty="0" err="1" smtClean="0">
+                <a:sym typeface="Wingdings"/>
+              </a:rPr>
+              <a:t>Xplore</a:t>
+            </a:r>
+            <a:endParaRPr lang="en-US" dirty="0" smtClean="0">
+              <a:sym typeface="Wingdings"/>
+            </a:endParaRPr>
+          </a:p>
+          <a:p>
+            <a:r>
+              <a:rPr lang="en-US" dirty="0" smtClean="0">
+                <a:sym typeface="Wingdings"/>
+              </a:rPr>
+              <a:t>	JSTOR</a:t>
+            </a:r>
+          </a:p>
+          <a:p>
+            <a:endParaRPr lang="en-US" dirty="0" smtClean="0">
+              <a:sym typeface="Wingdings"/>
+            </a:endParaRPr>
+          </a:p>
+          <a:p>
+            <a:r>
+              <a:rPr lang="en-US" dirty="0" smtClean="0">
+                <a:sym typeface="Wingdings"/>
+              </a:rPr>
+              <a:t>(if looking for a particular paper, start with </a:t>
+            </a:r>
+            <a:r>
+              <a:rPr lang="en-US" dirty="0" err="1" smtClean="0">
+                <a:sym typeface="Wingdings"/>
+              </a:rPr>
+              <a:t>google</a:t>
+            </a:r>
+            <a:r>
+              <a:rPr lang="en-US" dirty="0" smtClean="0">
+                <a:sym typeface="Wingdings"/>
+              </a:rPr>
+              <a:t> scholar to get info and then use </a:t>
+            </a:r>
+            <a:r>
+              <a:rPr lang="en-US" dirty="0" err="1" smtClean="0">
+                <a:sym typeface="Wingdings"/>
+              </a:rPr>
+              <a:t>libary</a:t>
+            </a:r>
+            <a:r>
+              <a:rPr lang="en-US" dirty="0" smtClean="0">
+                <a:sym typeface="Wingdings"/>
+              </a:rPr>
+              <a:t> to access it)</a:t>
             </a:r>
             <a:endParaRPr lang="en-US" dirty="0"/>
           </a:p>
@@ -5859,25 +5642,7 @@
           <a:p>
             <a:r>
               <a:rPr lang="en-US" dirty="0" smtClean="0"/>
-              <a:t>1) Specificity wins out over generality.</a:t>
-            </a:r>
-          </a:p>
-          <a:p>
-            <a:r>
-              <a:rPr lang="en-US" dirty="0" smtClean="0"/>
-              <a:t>2) Fine line between enthusiasm, excitement &amp; showboating, grandiosity</a:t>
-            </a:r>
-          </a:p>
-          <a:p>
-            <a:r>
-              <a:rPr lang="en-US" dirty="0" smtClean="0"/>
-              <a:t>			You want to make sure your idea is compelling,</a:t>
-            </a:r>
-          </a:p>
-          <a:p>
-            <a:r>
-              <a:rPr lang="en-US" dirty="0" smtClean="0"/>
-              <a:t>				but don't oversell it. </a:t>
+              <a:t>If you don't know which of the databases has your journal, use</a:t>
             </a:r>
           </a:p>
           <a:p>
@@ -5886,22 +5651,70 @@
           <a:p>
             <a:r>
               <a:rPr lang="en-US" dirty="0" smtClean="0"/>
-              <a:t>3) A little jargon indicates membership or familiarity with the community. </a:t>
-            </a:r>
-          </a:p>
-          <a:p>
-            <a:r>
-              <a:rPr lang="en-US" dirty="0" smtClean="0"/>
-              <a:t>			Language </a:t>
-            </a:r>
-            <a:r>
-              <a:rPr lang="en-US" dirty="0" smtClean="0"/>
-              <a:t>should be clear and exact, not flowery</a:t>
-            </a:r>
-            <a:r>
-              <a:rPr lang="en-US" dirty="0" smtClean="0"/>
-              <a:t> or opaque.</a:t>
-            </a:r>
+              <a:t>UCSB Library </a:t>
+            </a:r>
+            <a:r>
+              <a:rPr lang="en-US" dirty="0" err="1" smtClean="0">
+                <a:sym typeface="Wingdings"/>
+              </a:rPr>
+              <a:t></a:t>
+            </a:r>
+            <a:r>
+              <a:rPr lang="en-US" dirty="0" smtClean="0">
+                <a:sym typeface="Wingdings"/>
+              </a:rPr>
+              <a:t> Electronic Journals</a:t>
+            </a:r>
+          </a:p>
+          <a:p>
+            <a:r>
+              <a:rPr lang="en-US" dirty="0" smtClean="0"/>
+              <a:t>	and search for the title of the journal to see if you can get online access.</a:t>
+            </a:r>
+          </a:p>
+          <a:p>
+            <a:endParaRPr lang="en-US" dirty="0" smtClean="0"/>
+          </a:p>
+          <a:p>
+            <a:r>
+              <a:rPr lang="en-US" dirty="0" smtClean="0"/>
+              <a:t>UCSB Library </a:t>
+            </a:r>
+            <a:r>
+              <a:rPr lang="en-US" dirty="0" err="1" smtClean="0">
+                <a:sym typeface="Wingdings"/>
+              </a:rPr>
+              <a:t></a:t>
+            </a:r>
+            <a:r>
+              <a:rPr lang="en-US" dirty="0" smtClean="0">
+                <a:sym typeface="Wingdings"/>
+              </a:rPr>
+              <a:t> Article Database</a:t>
+            </a:r>
+            <a:endParaRPr lang="en-US" dirty="0" smtClean="0">
+              <a:sym typeface="Wingdings"/>
+            </a:endParaRPr>
+          </a:p>
+          <a:p>
+            <a:r>
+              <a:rPr lang="en-US" dirty="0" smtClean="0"/>
+              <a:t>	Academic Search Complete, way to look up terms across *all* disciplines</a:t>
+            </a:r>
+          </a:p>
+          <a:p>
+            <a:endParaRPr lang="en-US" dirty="0" smtClean="0"/>
+          </a:p>
+          <a:p>
+            <a:endParaRPr lang="en-US" dirty="0" smtClean="0"/>
+          </a:p>
+          <a:p>
+            <a:endParaRPr lang="en-US" dirty="0" smtClean="0"/>
+          </a:p>
+          <a:p>
+            <a:endParaRPr lang="en-US" dirty="0" smtClean="0"/>
+          </a:p>
+          <a:p>
             <a:endParaRPr lang="en-US" dirty="0" smtClean="0"/>
           </a:p>
           <a:p>
@@ -5971,12 +5784,30 @@
           <a:bodyPr/>
           <a:lstStyle/>
           <a:p>
+            <a:r>
+              <a:rPr lang="en-US" dirty="0" smtClean="0"/>
+              <a:t>Goal for multimedia researchers: </a:t>
+            </a:r>
+          </a:p>
+          <a:p>
             <a:endParaRPr lang="en-US" dirty="0" smtClean="0"/>
           </a:p>
           <a:p>
             <a:r>
               <a:rPr lang="en-US" dirty="0" smtClean="0"/>
-              <a:t>A paper should be like a good friend...</a:t>
+              <a:t>how to identify relevant information quickly...</a:t>
+            </a:r>
+          </a:p>
+          <a:p>
+            <a:r>
+              <a:rPr lang="en-US" dirty="0" smtClean="0"/>
+              <a:t>how to have insider information about</a:t>
+            </a:r>
+          </a:p>
+          <a:p>
+            <a:r>
+              <a:rPr lang="en-US" dirty="0" smtClean="0"/>
+              <a:t>	the most prestigious journals, the most widely talked about articles, the hot topics, the major players, etc etc.</a:t>
             </a:r>
           </a:p>
           <a:p>
@@ -5985,61 +5816,23 @@
           <a:p>
             <a:r>
               <a:rPr lang="en-US" dirty="0" smtClean="0"/>
-              <a:t>charming, but not bombastic</a:t>
-            </a:r>
-          </a:p>
-          <a:p>
-            <a:r>
-              <a:rPr lang="en-US" dirty="0" smtClean="0"/>
-              <a:t>helpful, but not in an annoying way</a:t>
-            </a:r>
-          </a:p>
-          <a:p>
-            <a:r>
-              <a:rPr lang="en-US" dirty="0" smtClean="0"/>
-              <a:t>articulate, but not boring</a:t>
-            </a:r>
-          </a:p>
-          <a:p>
-            <a:r>
-              <a:rPr lang="en-US" dirty="0" smtClean="0"/>
-              <a:t>authentic, but not sappy</a:t>
-            </a:r>
-          </a:p>
-          <a:p>
-            <a:r>
-              <a:rPr lang="en-US" dirty="0" smtClean="0"/>
-              <a:t>exciting, but not flashy</a:t>
-            </a:r>
-          </a:p>
-          <a:p>
-            <a:r>
-              <a:rPr lang="en-US" dirty="0" smtClean="0"/>
-              <a:t>opinionated, but not judgmentally so</a:t>
+              <a:t>important, because certain topics, phrases, agendas will clearly mark you as outsider or as an amateur, which may limit your ability to communicate.</a:t>
             </a:r>
           </a:p>
           <a:p>
             <a:endParaRPr lang="en-US" dirty="0" smtClean="0"/>
           </a:p>
           <a:p>
-            <a:r>
-              <a:rPr lang="en-US" dirty="0" smtClean="0"/>
-              <a:t> </a:t>
-            </a:r>
-          </a:p>
-          <a:p>
             <a:endParaRPr lang="en-US" dirty="0" smtClean="0"/>
           </a:p>
           <a:p>
             <a:endParaRPr lang="en-US" dirty="0" smtClean="0"/>
           </a:p>
           <a:p>
-            <a:endParaRPr lang="en-US" dirty="0" smtClean="0"/>
-          </a:p>
-          <a:p>
-            <a:endParaRPr lang="en-US" dirty="0" smtClean="0"/>
-          </a:p>
-          <a:p>
+            <a:r>
+              <a:rPr lang="en-US" dirty="0" smtClean="0"/>
+              <a:t>	</a:t>
+            </a:r>
             <a:endParaRPr lang="en-US" dirty="0"/>
           </a:p>
         </p:txBody>
@@ -6087,14 +5880,7 @@
           <a:bodyPr/>
           <a:lstStyle/>
           <a:p>
-            <a:r>
-              <a:rPr lang="en-US" dirty="0" smtClean="0"/>
-              <a:t>Writing Exercise</a:t>
-            </a:r>
-            <a:br>
-              <a:rPr lang="en-US" dirty="0" smtClean="0"/>
-            </a:br>
-            <a:endParaRPr lang="en-US" dirty="0"/>
+            <a:endParaRPr lang="en-US"/>
           </a:p>
         </p:txBody>
       </p:sp>
@@ -6118,14 +5904,50 @@
           <a:p>
             <a:r>
               <a:rPr lang="en-US" dirty="0" smtClean="0"/>
-              <a:t>1. Write down 10 things on slips of paper</a:t>
-            </a:r>
-          </a:p>
-          <a:p>
-            <a:r>
-              <a:rPr lang="en-US" dirty="0" smtClean="0"/>
-              <a:t>		"thing" = field, topic, person, theme, movement, etc... that you think is interesting (not necessarily something that you know anything about)</a:t>
-            </a:r>
+              <a:t>I'm sure you all have lots of examples of precise moments of realizing someone doesn't have the same knowledge as you.</a:t>
+            </a:r>
+          </a:p>
+          <a:p>
+            <a:endParaRPr lang="en-US" dirty="0" smtClean="0"/>
+          </a:p>
+          <a:p>
+            <a:r>
+              <a:rPr lang="en-US" dirty="0" smtClean="0"/>
+              <a:t>I talk with digital humanities people, and they make "mistakes" like over-emphasizing basic facts, or referring to topics that are "old news".</a:t>
+            </a:r>
+          </a:p>
+          <a:p>
+            <a:endParaRPr lang="en-US" dirty="0" smtClean="0"/>
+          </a:p>
+          <a:p>
+            <a:r>
+              <a:rPr lang="en-US" dirty="0" smtClean="0"/>
+              <a:t>ex. design aesthetic of </a:t>
+            </a:r>
+            <a:r>
+              <a:rPr lang="en-US" dirty="0" smtClean="0"/>
+              <a:t>a</a:t>
+            </a:r>
+            <a:r>
+              <a:rPr lang="en-US" dirty="0" smtClean="0"/>
+              <a:t> </a:t>
+            </a:r>
+            <a:r>
+              <a:rPr lang="en-US" dirty="0" err="1" smtClean="0"/>
+              <a:t>mysql</a:t>
+            </a:r>
+            <a:r>
+              <a:rPr lang="en-US" dirty="0" smtClean="0"/>
+              <a:t> database (?)</a:t>
+            </a:r>
+          </a:p>
+          <a:p>
+            <a:r>
+              <a:rPr lang="en-US" dirty="0" smtClean="0"/>
+              <a:t>ex. talking about virtual reality and second life </a:t>
+            </a:r>
+          </a:p>
+          <a:p>
             <a:endParaRPr lang="en-US" dirty="0"/>
           </a:p>
         </p:txBody>
@@ -6173,14 +5995,7 @@
           <a:bodyPr/>
           <a:lstStyle/>
           <a:p>
-            <a:r>
-              <a:rPr lang="en-US" dirty="0" smtClean="0"/>
-              <a:t>Writing Exercise</a:t>
-            </a:r>
-            <a:br>
-              <a:rPr lang="en-US" dirty="0" smtClean="0"/>
-            </a:br>
-            <a:endParaRPr lang="en-US" dirty="0"/>
+            <a:endParaRPr lang="en-US"/>
           </a:p>
         </p:txBody>
       </p:sp>
@@ -6199,55 +6014,40 @@
           <a:bodyPr/>
           <a:lstStyle/>
           <a:p>
+            <a:r>
+              <a:rPr lang="en-US" dirty="0" smtClean="0"/>
+              <a:t>Of course, you will often be an outsider if you are working between fields or in an evolving field, but you want to be able to indicate that you are an equal participant.</a:t>
+            </a:r>
+          </a:p>
+          <a:p>
             <a:endParaRPr lang="en-US" dirty="0" smtClean="0"/>
           </a:p>
           <a:p>
             <a:r>
               <a:rPr lang="en-US" dirty="0" smtClean="0"/>
-              <a:t>2. Groups of 3</a:t>
-            </a:r>
-          </a:p>
-          <a:p>
-            <a:r>
-              <a:rPr lang="en-US" dirty="0" smtClean="0"/>
-              <a:t>	1 person is the leader / first author</a:t>
-            </a:r>
-          </a:p>
-          <a:p>
-            <a:r>
-              <a:rPr lang="en-US" dirty="0" smtClean="0"/>
-              <a:t>		role of leader:</a:t>
-            </a:r>
-          </a:p>
-          <a:p>
-            <a:r>
-              <a:rPr lang="en-US" dirty="0" smtClean="0"/>
-              <a:t>			choose main point of paper</a:t>
-            </a:r>
-          </a:p>
-          <a:p>
-            <a:r>
-              <a:rPr lang="en-US" dirty="0" smtClean="0"/>
-              <a:t>			delegate as needed</a:t>
-            </a:r>
-          </a:p>
-          <a:p>
-            <a:r>
-              <a:rPr lang="en-US" dirty="0" smtClean="0"/>
-              <a:t>			</a:t>
-            </a:r>
-          </a:p>
-          <a:p>
-            <a:r>
-              <a:rPr lang="en-US" dirty="0" smtClean="0"/>
-              <a:t>Leader chooses 6 slips of paper at random</a:t>
-            </a:r>
-          </a:p>
-          <a:p>
-            <a:r>
-              <a:rPr lang="en-US" dirty="0" smtClean="0"/>
-              <a:t>Leader select 3 of these 6 and comes up with a research topic</a:t>
-            </a:r>
+              <a:t>So... how to get this information?</a:t>
+            </a:r>
+          </a:p>
+          <a:p>
+            <a:endParaRPr lang="en-US" dirty="0" smtClean="0"/>
+          </a:p>
+          <a:p>
+            <a:r>
+              <a:rPr lang="en-US" dirty="0" smtClean="0"/>
+              <a:t>1) ask an expert ... what are the most important conferences/journals? what topics are most exciting?</a:t>
+            </a:r>
+          </a:p>
+          <a:p>
+            <a:endParaRPr lang="en-US" dirty="0" smtClean="0"/>
+          </a:p>
+          <a:p>
+            <a:r>
+              <a:rPr lang="en-US" dirty="0" smtClean="0"/>
+              <a:t>2) look at the CV of people you respect, where do they publish/present?</a:t>
+            </a:r>
+          </a:p>
+          <a:p>
+            <a:endParaRPr lang="en-US" dirty="0" smtClean="0"/>
           </a:p>
           <a:p>
             <a:endParaRPr lang="en-US" dirty="0"/>
@@ -6297,81 +6097,84 @@
           <a:bodyPr/>
           <a:lstStyle/>
           <a:p>
-            <a:r>
-              <a:rPr lang="en-US" dirty="0" smtClean="0"/>
-              <a:t>Writing Exercise</a:t>
-            </a:r>
-            <a:br>
-              <a:rPr lang="en-US" dirty="0" smtClean="0"/>
-            </a:br>
+            <a:endParaRPr lang="en-US"/>
+          </a:p>
+        </p:txBody>
+      </p:sp>
+      <p:sp>
+        <p:nvSpPr>
+          <p:cNvPr id="3" name="Content Placeholder 2"/>
+          <p:cNvSpPr>
+            <a:spLocks noGrp="1"/>
+          </p:cNvSpPr>
+          <p:nvPr>
+            <p:ph idx="1"/>
+          </p:nvPr>
+        </p:nvSpPr>
+        <p:spPr/>
+        <p:txBody>
+          <a:bodyPr/>
+          <a:lstStyle/>
+          <a:p>
+            <a:r>
+              <a:rPr lang="en-US" dirty="0" smtClean="0"/>
+              <a:t>3) Look for respected "brands" : IEEE or ACM for technical conferences</a:t>
+            </a:r>
+          </a:p>
+          <a:p>
+            <a:endParaRPr lang="en-US" dirty="0" smtClean="0"/>
+          </a:p>
+          <a:p>
+            <a:r>
+              <a:rPr lang="en-US" dirty="0" smtClean="0"/>
+              <a:t>I made a mistake with the Information </a:t>
+            </a:r>
+            <a:r>
+              <a:rPr lang="en-US" dirty="0" err="1" smtClean="0"/>
+              <a:t>Visualisation</a:t>
+            </a:r>
+            <a:endParaRPr lang="en-US" dirty="0" smtClean="0"/>
+          </a:p>
+          <a:p>
+            <a:r>
+              <a:rPr lang="en-US" dirty="0" smtClean="0"/>
+              <a:t> (</a:t>
+            </a:r>
+            <a:r>
+              <a:rPr lang="en-US" dirty="0" err="1" smtClean="0"/>
+              <a:t>vs</a:t>
+            </a:r>
+            <a:r>
+              <a:rPr lang="en-US" dirty="0" smtClean="0"/>
+              <a:t> the IEEE information visualization) when doing literature review for my </a:t>
+            </a:r>
+            <a:r>
+              <a:rPr lang="en-US" dirty="0" err="1" smtClean="0"/>
+              <a:t>quals</a:t>
+            </a:r>
+            <a:r>
+              <a:rPr lang="en-US" dirty="0" smtClean="0"/>
+              <a:t>. </a:t>
+            </a:r>
+          </a:p>
+          <a:p>
+            <a:endParaRPr lang="en-US" dirty="0" smtClean="0"/>
+          </a:p>
+          <a:p>
+            <a:r>
+              <a:rPr lang="en-US" dirty="0" smtClean="0"/>
+              <a:t>citations counting, influence numbers are great, but not as useful for recent papers; and you can usually find the widely cited papers by starting with a recent paper.</a:t>
+            </a:r>
+          </a:p>
+          <a:p>
+            <a:endParaRPr lang="en-US" dirty="0" smtClean="0"/>
+          </a:p>
+          <a:p>
+            <a:r>
+              <a:rPr lang="en-US" dirty="0" smtClean="0"/>
+              <a:t>   </a:t>
+            </a:r>
             <a:endParaRPr lang="en-US" dirty="0"/>
-          </a:p>
-        </p:txBody>
-      </p:sp>
-      <p:sp>
-        <p:nvSpPr>
-          <p:cNvPr id="3" name="Content Placeholder 2"/>
-          <p:cNvSpPr>
-            <a:spLocks noGrp="1"/>
-          </p:cNvSpPr>
-          <p:nvPr>
-            <p:ph idx="1"/>
-          </p:nvPr>
-        </p:nvSpPr>
-        <p:spPr/>
-        <p:txBody>
-          <a:bodyPr/>
-          <a:lstStyle/>
-          <a:p>
-            <a:r>
-              <a:rPr lang="en-US" dirty="0" smtClean="0"/>
-              <a:t>3. Write a (short!) paper:</a:t>
-            </a:r>
-          </a:p>
-          <a:p>
-            <a:r>
-              <a:rPr lang="en-US" dirty="0" smtClean="0"/>
-              <a:t>		Must have these sections:</a:t>
-            </a:r>
-          </a:p>
-          <a:p>
-            <a:r>
-              <a:rPr lang="en-US" dirty="0" smtClean="0"/>
-              <a:t>Title</a:t>
-            </a:r>
-          </a:p>
-          <a:p>
-            <a:r>
-              <a:rPr lang="en-US" dirty="0" smtClean="0"/>
-              <a:t>Abstract</a:t>
-            </a:r>
-          </a:p>
-          <a:p>
-            <a:r>
-              <a:rPr lang="en-US" dirty="0" smtClean="0"/>
-              <a:t>Introduction</a:t>
-            </a:r>
-          </a:p>
-          <a:p>
-            <a:r>
-              <a:rPr lang="en-US" dirty="0" smtClean="0"/>
-              <a:t>Discussion</a:t>
-            </a:r>
-          </a:p>
-          <a:p>
-            <a:r>
-              <a:rPr lang="en-US" dirty="0" smtClean="0"/>
-              <a:t>Conclusion</a:t>
-            </a:r>
-          </a:p>
-          <a:p>
-            <a:r>
-              <a:rPr lang="en-US" dirty="0" smtClean="0"/>
-              <a:t>References</a:t>
-            </a:r>
-          </a:p>
-          <a:p>
-            <a:endParaRPr lang="en-US" dirty="0" smtClean="0"/>
           </a:p>
         </p:txBody>
       </p:sp>

</xml_diff>

<commit_message>
added prob stat hwk
</commit_message>
<xml_diff>
--- a/slides/week2_day1.pptx
+++ b/slides/week2_day1.pptx
@@ -5,10 +5,10 @@
     <p:sldMasterId id="2147483648" r:id="rId1"/>
   </p:sldMasterIdLst>
   <p:notesMasterIdLst>
-    <p:notesMasterId r:id="rId22"/>
+    <p:notesMasterId r:id="rId21"/>
   </p:notesMasterIdLst>
   <p:handoutMasterIdLst>
-    <p:handoutMasterId r:id="rId23"/>
+    <p:handoutMasterId r:id="rId22"/>
   </p:handoutMasterIdLst>
   <p:sldIdLst>
     <p:sldId id="281" r:id="rId2"/>
@@ -30,7 +30,6 @@
     <p:sldId id="305" r:id="rId18"/>
     <p:sldId id="307" r:id="rId19"/>
     <p:sldId id="308" r:id="rId20"/>
-    <p:sldId id="309" r:id="rId21"/>
   </p:sldIdLst>
   <p:sldSz cx="9144000" cy="6858000" type="screen4x3"/>
   <p:notesSz cx="6858000" cy="9144000"/>
@@ -215,7 +214,7 @@
             <a:fld id="{43DBBD18-6C88-F045-A73C-EAB7098132B3}" type="datetime1">
               <a:rPr lang="en-US" smtClean="0"/>
               <a:pPr/>
-              <a:t>4/12/11</a:t>
+              <a:t>4/19/11</a:t>
             </a:fld>
             <a:endParaRPr lang="en-US"/>
           </a:p>
@@ -378,7 +377,7 @@
             <a:fld id="{EAEF232E-3F8A-2D4B-A08F-882F821D32B7}" type="datetime1">
               <a:rPr lang="en-US" smtClean="0"/>
               <a:pPr/>
-              <a:t>4/12/11</a:t>
+              <a:t>4/19/11</a:t>
             </a:fld>
             <a:endParaRPr lang="en-US"/>
           </a:p>
@@ -3970,21 +3969,12 @@
           <a:p>
             <a:r>
               <a:rPr lang="en-US" dirty="0" smtClean="0"/>
-              <a:t>2) </a:t>
-            </a:r>
-            <a:r>
-              <a:rPr lang="en-US" dirty="0" smtClean="0"/>
-              <a:t>Find the most respected journals &amp; conferences that discuss</a:t>
-            </a:r>
-            <a:r>
-              <a:rPr lang="en-US" dirty="0" smtClean="0"/>
-              <a:t> surveillance in an artistic context. </a:t>
+              <a:t>2) Find the most respected journals &amp; conferences that discuss surveillance in an artistic context. </a:t>
             </a:r>
             <a:r>
               <a:rPr lang="en-US" smtClean="0"/>
               <a:t>Provide examples of papers.</a:t>
             </a:r>
-            <a:endParaRPr lang="en-US" smtClean="0"/>
           </a:p>
           <a:p>
             <a:r>
@@ -4071,15 +4061,7 @@
           <a:p>
             <a:r>
               <a:rPr lang="en-US" dirty="0" smtClean="0"/>
-              <a:t>10 </a:t>
-            </a:r>
-            <a:r>
-              <a:rPr lang="en-US" dirty="0" smtClean="0"/>
-              <a:t>minutes to prepare a 3-minute</a:t>
-            </a:r>
-            <a:r>
-              <a:rPr lang="en-US" dirty="0" smtClean="0"/>
-              <a:t> </a:t>
+              <a:t>10 minutes to prepare a 3-minute </a:t>
             </a:r>
             <a:r>
               <a:rPr lang="en-US" dirty="0" err="1" smtClean="0"/>
@@ -4093,23 +4075,7 @@
           <a:p>
             <a:r>
               <a:rPr lang="en-US" dirty="0" smtClean="0"/>
-              <a:t>		Your main point, Why </a:t>
-            </a:r>
-            <a:r>
-              <a:rPr lang="en-US" dirty="0" smtClean="0"/>
-              <a:t>it's </a:t>
-            </a:r>
-            <a:r>
-              <a:rPr lang="en-US" dirty="0" smtClean="0"/>
-              <a:t>important, Why </a:t>
-            </a:r>
-            <a:r>
-              <a:rPr lang="en-US" dirty="0" smtClean="0"/>
-              <a:t>audience should </a:t>
-            </a:r>
-            <a:r>
-              <a:rPr lang="en-US" dirty="0" smtClean="0"/>
-              <a:t>care, Quotes, Graphics, Bullet points, etc </a:t>
+              <a:t>		Your main point, Why it's important, Why audience should care, Quotes, Graphics, Bullet points, etc </a:t>
             </a:r>
           </a:p>
           <a:p>
@@ -4118,15 +4084,7 @@
           <a:p>
             <a:r>
               <a:rPr lang="en-US" dirty="0" smtClean="0"/>
-              <a:t>For </a:t>
-            </a:r>
-            <a:r>
-              <a:rPr lang="en-US" dirty="0" smtClean="0"/>
-              <a:t>the people who are not presenting, evaluate them according to different criteria and explain why you think that criteria is important. </a:t>
-            </a:r>
-            <a:r>
-              <a:rPr lang="en-US" dirty="0" smtClean="0"/>
-              <a:t> </a:t>
+              <a:t>For the people who are not presenting, evaluate them according to different criteria and explain why you think that criteria is important.  </a:t>
             </a:r>
             <a:r>
               <a:rPr lang="en-US" dirty="0" err="1" smtClean="0"/>
@@ -4134,15 +4092,7 @@
             </a:r>
             <a:r>
               <a:rPr lang="en-US" dirty="0" smtClean="0"/>
-              <a:t>.. </a:t>
-            </a:r>
-            <a:r>
-              <a:rPr lang="en-US" dirty="0" smtClean="0"/>
-              <a:t>relevance, creativity, originality, concept, clarity, speaking</a:t>
-            </a:r>
-            <a:r>
-              <a:rPr lang="en-US" dirty="0" smtClean="0"/>
-              <a:t> prowess... These will be anonymous, btw</a:t>
+              <a:t>.. relevance, creativity, originality, concept, clarity, speaking prowess... These will be anonymous, btw</a:t>
             </a:r>
             <a:endParaRPr lang="en-US" dirty="0"/>
           </a:p>
@@ -4228,15 +4178,7 @@
           <a:p>
             <a:r>
               <a:rPr lang="en-US" dirty="0" smtClean="0"/>
-              <a:t>Similar to Design Patterns in </a:t>
-            </a:r>
-            <a:r>
-              <a:rPr lang="en-US" dirty="0" smtClean="0"/>
-              <a:t>s</a:t>
-            </a:r>
-            <a:r>
-              <a:rPr lang="en-US" dirty="0" smtClean="0"/>
-              <a:t>oftware engineering.</a:t>
+              <a:t>Similar to Design Patterns in software engineering.</a:t>
             </a:r>
           </a:p>
           <a:p>
@@ -4245,21 +4187,13 @@
           <a:p>
             <a:r>
               <a:rPr lang="en-US" dirty="0" smtClean="0"/>
-              <a:t>R</a:t>
-            </a:r>
-            <a:r>
-              <a:rPr lang="en-US" dirty="0" smtClean="0"/>
-              <a:t>ead papers in journals in your field.</a:t>
-            </a:r>
-          </a:p>
-          <a:p>
-            <a:r>
-              <a:rPr lang="en-US" dirty="0" smtClean="0"/>
-              <a:t>	</a:t>
-            </a:r>
-            <a:r>
-              <a:rPr lang="en-US" dirty="0" smtClean="0"/>
-              <a:t>How are they framing their arguments?</a:t>
+              <a:t>Read papers in journals in your field.</a:t>
+            </a:r>
+          </a:p>
+          <a:p>
+            <a:r>
+              <a:rPr lang="en-US" dirty="0" smtClean="0"/>
+              <a:t>	How are they framing their arguments?</a:t>
             </a:r>
           </a:p>
           <a:p>
@@ -5223,107 +5157,6 @@
 </p:sld>
 </file>
 
-<file path=ppt/slides/slide20.xml><?xml version="1.0" encoding="utf-8"?>
-<p:sld xmlns:a="http://schemas.openxmlformats.org/drawingml/2006/main" xmlns:r="http://schemas.openxmlformats.org/officeDocument/2006/relationships" xmlns:mc="http://schemas.openxmlformats.org/markup-compatibility/2006" xmlns:mv="urn:schemas-microsoft-com:mac:vml" xmlns:p="http://schemas.openxmlformats.org/presentationml/2006/main" mc:Ignorable="mv" mc:PreserveAttributes="mv:*">
-  <p:cSld>
-    <p:spTree>
-      <p:nvGrpSpPr>
-        <p:cNvPr id="1" name=""/>
-        <p:cNvGrpSpPr/>
-        <p:nvPr/>
-      </p:nvGrpSpPr>
-      <p:grpSpPr>
-        <a:xfrm>
-          <a:off x="0" y="0"/>
-          <a:ext cx="0" cy="0"/>
-          <a:chOff x="0" y="0"/>
-          <a:chExt cx="0" cy="0"/>
-        </a:xfrm>
-      </p:grpSpPr>
-      <p:sp>
-        <p:nvSpPr>
-          <p:cNvPr id="2" name="Title 1"/>
-          <p:cNvSpPr>
-            <a:spLocks noGrp="1"/>
-          </p:cNvSpPr>
-          <p:nvPr>
-            <p:ph type="title"/>
-          </p:nvPr>
-        </p:nvSpPr>
-        <p:spPr/>
-        <p:txBody>
-          <a:bodyPr/>
-          <a:lstStyle/>
-          <a:p>
-            <a:endParaRPr lang="en-US"/>
-          </a:p>
-        </p:txBody>
-      </p:sp>
-      <p:sp>
-        <p:nvSpPr>
-          <p:cNvPr id="3" name="Content Placeholder 2"/>
-          <p:cNvSpPr>
-            <a:spLocks noGrp="1"/>
-          </p:cNvSpPr>
-          <p:nvPr>
-            <p:ph idx="1"/>
-          </p:nvPr>
-        </p:nvSpPr>
-        <p:spPr/>
-        <p:txBody>
-          <a:bodyPr/>
-          <a:lstStyle/>
-          <a:p>
-            <a:r>
-              <a:rPr lang="en-US" dirty="0" smtClean="0"/>
-              <a:t>Homework  2 cont) </a:t>
-            </a:r>
-          </a:p>
-          <a:p>
-            <a:endParaRPr lang="en-US" dirty="0" smtClean="0"/>
-          </a:p>
-          <a:p>
-            <a:r>
-              <a:rPr lang="en-US" dirty="0" smtClean="0"/>
-              <a:t>Prepare </a:t>
-            </a:r>
-            <a:r>
-              <a:rPr lang="en-US" dirty="0" smtClean="0"/>
-              <a:t>an exactly 8 minute presentation on your discoveries..</a:t>
-            </a:r>
-            <a:r>
-              <a:rPr lang="en-US" dirty="0" smtClean="0"/>
-              <a:t>.</a:t>
-            </a:r>
-          </a:p>
-          <a:p>
-            <a:endParaRPr lang="en-US" dirty="0" smtClean="0"/>
-          </a:p>
-          <a:p>
-            <a:r>
-              <a:rPr lang="en-US" dirty="0" smtClean="0"/>
-              <a:t>Your presentation should be more of a vivacious "friend" that your paper writing... That is, can be less formal, less of a burden of proof for each of your claims.</a:t>
-            </a:r>
-          </a:p>
-          <a:p>
-            <a:endParaRPr lang="en-US" dirty="0" smtClean="0"/>
-          </a:p>
-          <a:p>
-            <a:endParaRPr lang="en-US" dirty="0"/>
-          </a:p>
-        </p:txBody>
-      </p:sp>
-    </p:spTree>
-  </p:cSld>
-  <p:clrMapOvr>
-    <a:masterClrMapping/>
-  </p:clrMapOvr>
-  <p:transition spd="slow" advClick="0" advTm="3000">
-    <p:fade/>
-  </p:transition>
-</p:sld>
-</file>
-
 <file path=ppt/slides/slide3.xml><?xml version="1.0" encoding="utf-8"?>
 <p:sld xmlns:a="http://schemas.openxmlformats.org/drawingml/2006/main" xmlns:r="http://schemas.openxmlformats.org/officeDocument/2006/relationships" xmlns:mc="http://schemas.openxmlformats.org/markup-compatibility/2006" xmlns:mv="urn:schemas-microsoft-com:mac:vml" xmlns:p="http://schemas.openxmlformats.org/presentationml/2006/main" mc:Ignorable="mv" mc:PreserveAttributes="mv:*">
   <p:cSld>
@@ -5692,9 +5525,6 @@
               </a:rPr>
               <a:t> Article Database</a:t>
             </a:r>
-            <a:endParaRPr lang="en-US" dirty="0" smtClean="0">
-              <a:sym typeface="Wingdings"/>
-            </a:endParaRPr>
           </a:p>
           <a:p>
             <a:r>
@@ -5904,7 +5734,11 @@
           <a:p>
             <a:r>
               <a:rPr lang="en-US" dirty="0" smtClean="0"/>
-              <a:t>I'm sure you all have lots of examples of precise moments of realizing someone doesn't have the same knowledge as you.</a:t>
+              <a:t>I'm sure you all have lots of examples of precise moments of realizing someone doesn't have the same knowledge as you</a:t>
+            </a:r>
+            <a:r>
+              <a:rPr lang="en-US" dirty="0" smtClean="0"/>
+              <a:t>. And you probably make similar "mistakes" without realizing it.</a:t>
             </a:r>
           </a:p>
           <a:p>
@@ -5913,24 +5747,45 @@
           <a:p>
             <a:r>
               <a:rPr lang="en-US" dirty="0" smtClean="0"/>
-              <a:t>I talk with digital humanities people, and they make "mistakes" like over-emphasizing basic facts, or referring to topics that are "old news".</a:t>
-            </a:r>
-          </a:p>
-          <a:p>
+              <a:t>digital </a:t>
+            </a:r>
+            <a:r>
+              <a:rPr lang="en-US" dirty="0" smtClean="0"/>
+              <a:t>humanities </a:t>
+            </a:r>
+            <a:r>
+              <a:rPr lang="en-US" dirty="0" smtClean="0"/>
+              <a:t>people</a:t>
+            </a:r>
+            <a:r>
+              <a:rPr lang="en-US" dirty="0" smtClean="0"/>
+              <a:t> </a:t>
+            </a:r>
+            <a:r>
+              <a:rPr lang="en-US" dirty="0" smtClean="0"/>
+              <a:t>make </a:t>
+            </a:r>
+            <a:r>
+              <a:rPr lang="en-US" dirty="0" smtClean="0"/>
+              <a:t>"mistakes" like over-emphasizing basic facts, or referring to topics that are "old news"</a:t>
+            </a:r>
+            <a:r>
+              <a:rPr lang="en-US" dirty="0" smtClean="0"/>
+              <a:t>. i.e., a </a:t>
+            </a:r>
+            <a:r>
+              <a:rPr lang="en-US" dirty="0" smtClean="0"/>
+              <a:t>CS person would think that...</a:t>
+            </a:r>
             <a:endParaRPr lang="en-US" dirty="0" smtClean="0"/>
           </a:p>
           <a:p>
-            <a:r>
-              <a:rPr lang="en-US" dirty="0" smtClean="0"/>
-              <a:t>ex. design aesthetic of </a:t>
-            </a:r>
-            <a:r>
-              <a:rPr lang="en-US" dirty="0" smtClean="0"/>
-              <a:t>a</a:t>
-            </a:r>
-            <a:r>
-              <a:rPr lang="en-US" dirty="0" smtClean="0"/>
-              <a:t> </a:t>
+            <a:endParaRPr lang="en-US" dirty="0" smtClean="0"/>
+          </a:p>
+          <a:p>
+            <a:r>
+              <a:rPr lang="en-US" dirty="0" smtClean="0"/>
+              <a:t>ex. design aesthetic of a </a:t>
             </a:r>
             <a:r>
               <a:rPr lang="en-US" dirty="0" err="1" smtClean="0"/>
@@ -5944,7 +5799,11 @@
           <a:p>
             <a:r>
               <a:rPr lang="en-US" dirty="0" smtClean="0"/>
-              <a:t>ex. talking about virtual reality and second life </a:t>
+              <a:t>ex. talking about virtual reality and second life</a:t>
+            </a:r>
+            <a:r>
+              <a:rPr lang="en-US" dirty="0" smtClean="0"/>
+              <a:t> economics</a:t>
             </a:r>
           </a:p>
           <a:p>

</xml_diff>